<commit_message>
notes added to PPT
</commit_message>
<xml_diff>
--- a/Presentation_What drives parent’s decisions when choosing a name.pptx
+++ b/Presentation_What drives parent’s decisions when choosing a name.pptx
@@ -4094,11 +4094,54 @@
         </p:blipFill>
         <p:spPr>
           <a:xfrm>
-            <a:off x="2022633" y="1865243"/>
-            <a:ext cx="8146733" cy="4525963"/>
+            <a:off x="277917" y="1896775"/>
+            <a:ext cx="7321064" cy="4067258"/>
           </a:xfrm>
         </p:spPr>
       </p:pic>
+      <p:sp>
+        <p:nvSpPr>
+          <p:cNvPr id="3" name="Rectangle 2">
+            <a:extLst>
+              <a:ext uri="{FF2B5EF4-FFF2-40B4-BE49-F238E27FC236}">
+                <a16:creationId xmlns:a16="http://schemas.microsoft.com/office/drawing/2014/main" id="{C3A2E1B9-D44D-3047-9220-A956636E8E53}"/>
+              </a:ext>
+            </a:extLst>
+          </p:cNvPr>
+          <p:cNvSpPr/>
+          <p:nvPr/>
+        </p:nvSpPr>
+        <p:spPr>
+          <a:xfrm>
+            <a:off x="7924204" y="3007074"/>
+            <a:ext cx="4110140" cy="1754326"/>
+          </a:xfrm>
+          <a:prstGeom prst="rect">
+            <a:avLst/>
+          </a:prstGeom>
+        </p:spPr>
+        <p:txBody>
+          <a:bodyPr wrap="square">
+            <a:spAutoFit/>
+          </a:bodyPr>
+          <a:lstStyle/>
+          <a:p>
+            <a:r>
+              <a:rPr lang="en-US" dirty="0"/>
+              <a:t>Among the top 30 names in the US from 1910-2018, only 3 of them are female names.</a:t>
+            </a:r>
+          </a:p>
+          <a:p>
+            <a:endParaRPr lang="en-US" dirty="0"/>
+          </a:p>
+          <a:p>
+            <a:r>
+              <a:rPr lang="en-US" dirty="0"/>
+              <a:t>This indicates to a greater diversity among female names.</a:t>
+            </a:r>
+          </a:p>
+        </p:txBody>
+      </p:sp>
     </p:spTree>
     <p:extLst>
       <p:ext uri="{BB962C8B-B14F-4D97-AF65-F5344CB8AC3E}">
@@ -4192,11 +4235,45 @@
         </p:blipFill>
         <p:spPr>
           <a:xfrm>
-            <a:off x="2022633" y="1891748"/>
+            <a:off x="99240" y="1417638"/>
             <a:ext cx="8146733" cy="4525963"/>
           </a:xfrm>
         </p:spPr>
       </p:pic>
+      <p:sp>
+        <p:nvSpPr>
+          <p:cNvPr id="4" name="Rectangle 3">
+            <a:extLst>
+              <a:ext uri="{FF2B5EF4-FFF2-40B4-BE49-F238E27FC236}">
+                <a16:creationId xmlns:a16="http://schemas.microsoft.com/office/drawing/2014/main" id="{7E137202-9E6D-1B4A-968B-684C18066850}"/>
+              </a:ext>
+            </a:extLst>
+          </p:cNvPr>
+          <p:cNvSpPr/>
+          <p:nvPr/>
+        </p:nvSpPr>
+        <p:spPr>
+          <a:xfrm>
+            <a:off x="8692054" y="3007074"/>
+            <a:ext cx="3342289" cy="1477328"/>
+          </a:xfrm>
+          <a:prstGeom prst="rect">
+            <a:avLst/>
+          </a:prstGeom>
+        </p:spPr>
+        <p:txBody>
+          <a:bodyPr wrap="square">
+            <a:spAutoFit/>
+          </a:bodyPr>
+          <a:lstStyle/>
+          <a:p>
+            <a:r>
+              <a:rPr lang="en-US" dirty="0"/>
+              <a:t>Diversity in the names increases throughout the decades, although female names remain more diverse than male names.</a:t>
+            </a:r>
+          </a:p>
+        </p:txBody>
+      </p:sp>
     </p:spTree>
     <p:extLst>
       <p:ext uri="{BB962C8B-B14F-4D97-AF65-F5344CB8AC3E}">
@@ -4285,11 +4362,45 @@
         </p:blipFill>
         <p:spPr>
           <a:xfrm>
-            <a:off x="2022633" y="1600200"/>
+            <a:off x="0" y="1705304"/>
             <a:ext cx="8146733" cy="4525963"/>
           </a:xfrm>
         </p:spPr>
       </p:pic>
+      <p:sp>
+        <p:nvSpPr>
+          <p:cNvPr id="12" name="Rectangle 11">
+            <a:extLst>
+              <a:ext uri="{FF2B5EF4-FFF2-40B4-BE49-F238E27FC236}">
+                <a16:creationId xmlns:a16="http://schemas.microsoft.com/office/drawing/2014/main" id="{A8686508-832D-A044-8ED3-563651B75775}"/>
+              </a:ext>
+            </a:extLst>
+          </p:cNvPr>
+          <p:cNvSpPr/>
+          <p:nvPr/>
+        </p:nvSpPr>
+        <p:spPr>
+          <a:xfrm>
+            <a:off x="8534398" y="3091157"/>
+            <a:ext cx="3342289" cy="1477328"/>
+          </a:xfrm>
+          <a:prstGeom prst="rect">
+            <a:avLst/>
+          </a:prstGeom>
+        </p:spPr>
+        <p:txBody>
+          <a:bodyPr wrap="square">
+            <a:spAutoFit/>
+          </a:bodyPr>
+          <a:lstStyle/>
+          <a:p>
+            <a:r>
+              <a:rPr lang="en-US" dirty="0"/>
+              <a:t>Diversity in the names increases throughout the decades, although female names remain more diverse than male names.</a:t>
+            </a:r>
+          </a:p>
+        </p:txBody>
+      </p:sp>
     </p:spTree>
     <p:extLst>
       <p:ext uri="{BB962C8B-B14F-4D97-AF65-F5344CB8AC3E}">
@@ -7097,11 +7208,7 @@
             </a:r>
             <a:r>
               <a:rPr lang="en-US" sz="2000" dirty="0"/>
-              <a:t> </a:t>
-            </a:r>
-            <a:r>
-              <a:rPr lang="en-US" sz="2000"/>
-              <a:t>Python library</a:t>
+              <a:t> Python library</a:t>
             </a:r>
           </a:p>
           <a:p>
@@ -7109,12 +7216,8 @@
               <a:buChar char="•"/>
             </a:pPr>
             <a:r>
-              <a:rPr lang="en-US" sz="2400"/>
-              <a:t>Question </a:t>
-            </a:r>
-            <a:r>
               <a:rPr lang="en-US" sz="2400" dirty="0"/>
-              <a:t>3 – relationship of names to popular culture</a:t>
+              <a:t>Question 3 – relationship of names to popular culture</a:t>
             </a:r>
           </a:p>
           <a:p>

</xml_diff>

<commit_message>
more notes to PPT
</commit_message>
<xml_diff>
--- a/Presentation_What drives parent’s decisions when choosing a name.pptx
+++ b/Presentation_What drives parent’s decisions when choosing a name.pptx
@@ -4369,10 +4369,10 @@
       </p:pic>
       <p:sp>
         <p:nvSpPr>
-          <p:cNvPr id="12" name="Rectangle 11">
-            <a:extLst>
-              <a:ext uri="{FF2B5EF4-FFF2-40B4-BE49-F238E27FC236}">
-                <a16:creationId xmlns:a16="http://schemas.microsoft.com/office/drawing/2014/main" id="{A8686508-832D-A044-8ED3-563651B75775}"/>
+          <p:cNvPr id="13" name="Rectangle 12">
+            <a:extLst>
+              <a:ext uri="{FF2B5EF4-FFF2-40B4-BE49-F238E27FC236}">
+                <a16:creationId xmlns:a16="http://schemas.microsoft.com/office/drawing/2014/main" id="{2CE9F223-D7F4-CD49-88EC-A80F29FFC9E5}"/>
               </a:ext>
             </a:extLst>
           </p:cNvPr>
@@ -4381,8 +4381,8 @@
         </p:nvSpPr>
         <p:spPr>
           <a:xfrm>
-            <a:off x="8534398" y="3091157"/>
-            <a:ext cx="3342289" cy="1477328"/>
+            <a:off x="8692054" y="3007074"/>
+            <a:ext cx="3342289" cy="923330"/>
           </a:xfrm>
           <a:prstGeom prst="rect">
             <a:avLst/>
@@ -4396,7 +4396,7 @@
           <a:p>
             <a:r>
               <a:rPr lang="en-US" dirty="0"/>
-              <a:t>Diversity in the names increases throughout the decades, although female names remain more diverse than male names.</a:t>
+              <a:t>States with large cities have higher number of unique names among females.</a:t>
             </a:r>
           </a:p>
         </p:txBody>
@@ -4489,11 +4489,45 @@
         </p:blipFill>
         <p:spPr>
           <a:xfrm>
-            <a:off x="2022633" y="1600200"/>
+            <a:off x="0" y="1768365"/>
             <a:ext cx="8146733" cy="4525963"/>
           </a:xfrm>
         </p:spPr>
       </p:pic>
+      <p:sp>
+        <p:nvSpPr>
+          <p:cNvPr id="9" name="Rectangle 8">
+            <a:extLst>
+              <a:ext uri="{FF2B5EF4-FFF2-40B4-BE49-F238E27FC236}">
+                <a16:creationId xmlns:a16="http://schemas.microsoft.com/office/drawing/2014/main" id="{2C0332BE-3763-5445-84E0-B69B21C8D31B}"/>
+              </a:ext>
+            </a:extLst>
+          </p:cNvPr>
+          <p:cNvSpPr/>
+          <p:nvPr/>
+        </p:nvSpPr>
+        <p:spPr>
+          <a:xfrm>
+            <a:off x="8692054" y="3007074"/>
+            <a:ext cx="3342289" cy="923330"/>
+          </a:xfrm>
+          <a:prstGeom prst="rect">
+            <a:avLst/>
+          </a:prstGeom>
+        </p:spPr>
+        <p:txBody>
+          <a:bodyPr wrap="square">
+            <a:spAutoFit/>
+          </a:bodyPr>
+          <a:lstStyle/>
+          <a:p>
+            <a:r>
+              <a:rPr lang="en-US" dirty="0"/>
+              <a:t>States with large cities have higher number of unique names among males.</a:t>
+            </a:r>
+          </a:p>
+        </p:txBody>
+      </p:sp>
     </p:spTree>
     <p:extLst>
       <p:ext uri="{BB962C8B-B14F-4D97-AF65-F5344CB8AC3E}">
@@ -4582,11 +4616,45 @@
         </p:blipFill>
         <p:spPr>
           <a:xfrm>
-            <a:off x="2022633" y="1600200"/>
+            <a:off x="0" y="1705304"/>
             <a:ext cx="8146733" cy="4525963"/>
           </a:xfrm>
         </p:spPr>
       </p:pic>
+      <p:sp>
+        <p:nvSpPr>
+          <p:cNvPr id="6" name="Rectangle 5">
+            <a:extLst>
+              <a:ext uri="{FF2B5EF4-FFF2-40B4-BE49-F238E27FC236}">
+                <a16:creationId xmlns:a16="http://schemas.microsoft.com/office/drawing/2014/main" id="{F0503981-CC07-3F44-80F8-9C51CD80F1E2}"/>
+              </a:ext>
+            </a:extLst>
+          </p:cNvPr>
+          <p:cNvSpPr/>
+          <p:nvPr/>
+        </p:nvSpPr>
+        <p:spPr>
+          <a:xfrm>
+            <a:off x="8692054" y="3007074"/>
+            <a:ext cx="3342289" cy="1477328"/>
+          </a:xfrm>
+          <a:prstGeom prst="rect">
+            <a:avLst/>
+          </a:prstGeom>
+        </p:spPr>
+        <p:txBody>
+          <a:bodyPr wrap="square">
+            <a:spAutoFit/>
+          </a:bodyPr>
+          <a:lstStyle/>
+          <a:p>
+            <a:r>
+              <a:rPr lang="en-US" dirty="0"/>
+              <a:t>When we look at unique name rate, we see that actually smaller states have more unique names vs. the number of people in that state.</a:t>
+            </a:r>
+          </a:p>
+        </p:txBody>
+      </p:sp>
     </p:spTree>
     <p:extLst>
       <p:ext uri="{BB962C8B-B14F-4D97-AF65-F5344CB8AC3E}">
@@ -4675,11 +4743,54 @@
         </p:blipFill>
         <p:spPr>
           <a:xfrm>
-            <a:off x="2022633" y="1600200"/>
+            <a:off x="0" y="1768366"/>
             <a:ext cx="8146733" cy="4525963"/>
           </a:xfrm>
         </p:spPr>
       </p:pic>
+      <p:sp>
+        <p:nvSpPr>
+          <p:cNvPr id="6" name="Rectangle 5">
+            <a:extLst>
+              <a:ext uri="{FF2B5EF4-FFF2-40B4-BE49-F238E27FC236}">
+                <a16:creationId xmlns:a16="http://schemas.microsoft.com/office/drawing/2014/main" id="{8A7623B1-3C19-FA41-BECB-8DC2443B1DA4}"/>
+              </a:ext>
+            </a:extLst>
+          </p:cNvPr>
+          <p:cNvSpPr/>
+          <p:nvPr/>
+        </p:nvSpPr>
+        <p:spPr>
+          <a:xfrm>
+            <a:off x="8376744" y="2870439"/>
+            <a:ext cx="3342289" cy="2308324"/>
+          </a:xfrm>
+          <a:prstGeom prst="rect">
+            <a:avLst/>
+          </a:prstGeom>
+        </p:spPr>
+        <p:txBody>
+          <a:bodyPr wrap="square">
+            <a:spAutoFit/>
+          </a:bodyPr>
+          <a:lstStyle/>
+          <a:p>
+            <a:r>
+              <a:rPr lang="en-US" dirty="0"/>
+              <a:t>When we look at unique name rate, we see that actually smaller states have more unique names vs. the number of people in that state.</a:t>
+            </a:r>
+          </a:p>
+          <a:p>
+            <a:endParaRPr lang="en-US" dirty="0"/>
+          </a:p>
+          <a:p>
+            <a:r>
+              <a:rPr lang="en-US" dirty="0"/>
+              <a:t>This has seen both among female and male names.</a:t>
+            </a:r>
+          </a:p>
+        </p:txBody>
+      </p:sp>
     </p:spTree>
     <p:extLst>
       <p:ext uri="{BB962C8B-B14F-4D97-AF65-F5344CB8AC3E}">

</xml_diff>